<commit_message>
[DOC] Update some questions.
</commit_message>
<xml_diff>
--- a/doc/高速自组网.pptx
+++ b/doc/高速自组网.pptx
@@ -8,16 +8,25 @@
     <p:sldId id="256" r:id="rId2"/>
     <p:sldId id="258" r:id="rId3"/>
     <p:sldId id="279" r:id="rId4"/>
-    <p:sldId id="259" r:id="rId5"/>
-    <p:sldId id="276" r:id="rId6"/>
-    <p:sldId id="273" r:id="rId7"/>
-    <p:sldId id="257" r:id="rId8"/>
-    <p:sldId id="274" r:id="rId9"/>
-    <p:sldId id="275" r:id="rId10"/>
-    <p:sldId id="278" r:id="rId11"/>
-    <p:sldId id="277" r:id="rId12"/>
-    <p:sldId id="271" r:id="rId13"/>
-    <p:sldId id="272" r:id="rId14"/>
+    <p:sldId id="284" r:id="rId5"/>
+    <p:sldId id="259" r:id="rId6"/>
+    <p:sldId id="288" r:id="rId7"/>
+    <p:sldId id="276" r:id="rId8"/>
+    <p:sldId id="273" r:id="rId9"/>
+    <p:sldId id="257" r:id="rId10"/>
+    <p:sldId id="274" r:id="rId11"/>
+    <p:sldId id="275" r:id="rId12"/>
+    <p:sldId id="282" r:id="rId13"/>
+    <p:sldId id="283" r:id="rId14"/>
+    <p:sldId id="285" r:id="rId15"/>
+    <p:sldId id="286" r:id="rId16"/>
+    <p:sldId id="287" r:id="rId17"/>
+    <p:sldId id="278" r:id="rId18"/>
+    <p:sldId id="277" r:id="rId19"/>
+    <p:sldId id="281" r:id="rId20"/>
+    <p:sldId id="280" r:id="rId21"/>
+    <p:sldId id="271" r:id="rId22"/>
+    <p:sldId id="272" r:id="rId23"/>
   </p:sldIdLst>
   <p:sldSz cx="12192000" cy="6858000"/>
   <p:notesSz cx="6858000" cy="9144000"/>
@@ -135,6 +144,78 @@
 </p:presentation>
 </file>
 
+<file path=ppt/commentAuthors.xml><?xml version="1.0" encoding="utf-8"?>
+<p:cmAuthorLst xmlns:a="http://schemas.openxmlformats.org/drawingml/2006/main" xmlns:r="http://schemas.openxmlformats.org/officeDocument/2006/relationships" xmlns:p="http://schemas.openxmlformats.org/presentationml/2006/main">
+  <p:cmAuthor id="1" name="侯文韬" initials="joy" lastIdx="5" clrIdx="0">
+    <p:extLst>
+      <p:ext uri="{19B8F6BF-5375-455C-9EA6-DF929625EA0E}">
+        <p15:presenceInfo xmlns:p15="http://schemas.microsoft.com/office/powerpoint/2012/main" userId="侯文韬" providerId="None"/>
+      </p:ext>
+    </p:extLst>
+  </p:cmAuthor>
+</p:cmAuthorLst>
+</file>
+
+<file path=ppt/comments/comment1.xml><?xml version="1.0" encoding="utf-8"?>
+<p:cmLst xmlns:a="http://schemas.openxmlformats.org/drawingml/2006/main" xmlns:r="http://schemas.openxmlformats.org/officeDocument/2006/relationships" xmlns:p="http://schemas.openxmlformats.org/presentationml/2006/main">
+  <p:cm authorId="1" dt="2018-09-13T10:38:10.325" idx="1">
+    <p:pos x="5380" y="1793"/>
+    <p:text>做过考证</p:text>
+    <p:extLst>
+      <p:ext uri="{C676402C-5697-4E1C-873F-D02D1690AC5C}">
+        <p15:threadingInfo xmlns:p15="http://schemas.microsoft.com/office/powerpoint/2012/main" timeZoneBias="-480"/>
+      </p:ext>
+    </p:extLst>
+  </p:cm>
+  <p:cm authorId="1" dt="2018-09-13T10:38:39.755" idx="2">
+    <p:pos x="6532" y="1250"/>
+    <p:text>解调等计算需要好的CPU</p:text>
+    <p:extLst>
+      <p:ext uri="{C676402C-5697-4E1C-873F-D02D1690AC5C}">
+        <p15:threadingInfo xmlns:p15="http://schemas.microsoft.com/office/powerpoint/2012/main" timeZoneBias="-480"/>
+      </p:ext>
+    </p:extLst>
+  </p:cm>
+</p:cmLst>
+</file>
+
+<file path=ppt/comments/comment2.xml><?xml version="1.0" encoding="utf-8"?>
+<p:cmLst xmlns:a="http://schemas.openxmlformats.org/drawingml/2006/main" xmlns:r="http://schemas.openxmlformats.org/officeDocument/2006/relationships" xmlns:p="http://schemas.openxmlformats.org/presentationml/2006/main">
+  <p:cm authorId="1" dt="2018-09-13T11:20:51.245" idx="5">
+    <p:pos x="2120" y="1250"/>
+    <p:text>和我们常用的射频模块不一样的地方</p:text>
+    <p:extLst>
+      <p:ext uri="{C676402C-5697-4E1C-873F-D02D1690AC5C}">
+        <p15:threadingInfo xmlns:p15="http://schemas.microsoft.com/office/powerpoint/2012/main" timeZoneBias="-480"/>
+      </p:ext>
+    </p:extLst>
+  </p:cm>
+</p:cmLst>
+</file>
+
+<file path=ppt/comments/comment3.xml><?xml version="1.0" encoding="utf-8"?>
+<p:cmLst xmlns:a="http://schemas.openxmlformats.org/drawingml/2006/main" xmlns:r="http://schemas.openxmlformats.org/officeDocument/2006/relationships" xmlns:p="http://schemas.openxmlformats.org/presentationml/2006/main">
+  <p:cm authorId="1" dt="2018-09-13T11:09:43.705" idx="3">
+    <p:pos x="3110" y="2097"/>
+    <p:text>提示：arp icmp</p:text>
+    <p:extLst>
+      <p:ext uri="{C676402C-5697-4E1C-873F-D02D1690AC5C}">
+        <p15:threadingInfo xmlns:p15="http://schemas.microsoft.com/office/powerpoint/2012/main" timeZoneBias="-480"/>
+      </p:ext>
+    </p:extLst>
+  </p:cm>
+  <p:cm authorId="1" dt="2018-09-13T11:10:04.121" idx="4">
+    <p:pos x="2120" y="1498"/>
+    <p:text>提示：收到重复包，详细见包中分析</p:text>
+    <p:extLst>
+      <p:ext uri="{C676402C-5697-4E1C-873F-D02D1690AC5C}">
+        <p15:threadingInfo xmlns:p15="http://schemas.microsoft.com/office/powerpoint/2012/main" timeZoneBias="-480"/>
+      </p:ext>
+    </p:extLst>
+  </p:cm>
+</p:cmLst>
+</file>
+
 <file path=ppt/slideLayouts/slideLayout1.xml><?xml version="1.0" encoding="utf-8"?>
 <p:sldLayout xmlns:a="http://schemas.openxmlformats.org/drawingml/2006/main" xmlns:r="http://schemas.openxmlformats.org/officeDocument/2006/relationships" xmlns:p="http://schemas.openxmlformats.org/presentationml/2006/main" type="title" preserve="1">
   <p:cSld name="标题幻灯片">
@@ -308,7 +389,7 @@
           <a:p>
             <a:fld id="{54B809B6-A3A9-40A4-9A0A-11A83E6FE1C4}" type="datetimeFigureOut">
               <a:rPr lang="zh-CN" altLang="en-US" smtClean="0"/>
-              <a:t>2018-09-12</a:t>
+              <a:t>2018-09-13</a:t>
             </a:fld>
             <a:endParaRPr lang="zh-CN" altLang="en-US"/>
           </a:p>
@@ -473,7 +554,7 @@
           <a:p>
             <a:fld id="{54B809B6-A3A9-40A4-9A0A-11A83E6FE1C4}" type="datetimeFigureOut">
               <a:rPr lang="zh-CN" altLang="en-US" smtClean="0"/>
-              <a:t>2018-09-12</a:t>
+              <a:t>2018-09-13</a:t>
             </a:fld>
             <a:endParaRPr lang="zh-CN" altLang="en-US"/>
           </a:p>
@@ -648,7 +729,7 @@
           <a:p>
             <a:fld id="{54B809B6-A3A9-40A4-9A0A-11A83E6FE1C4}" type="datetimeFigureOut">
               <a:rPr lang="zh-CN" altLang="en-US" smtClean="0"/>
-              <a:t>2018-09-12</a:t>
+              <a:t>2018-09-13</a:t>
             </a:fld>
             <a:endParaRPr lang="zh-CN" altLang="en-US"/>
           </a:p>
@@ -813,7 +894,7 @@
           <a:p>
             <a:fld id="{54B809B6-A3A9-40A4-9A0A-11A83E6FE1C4}" type="datetimeFigureOut">
               <a:rPr lang="zh-CN" altLang="en-US" smtClean="0"/>
-              <a:t>2018-09-12</a:t>
+              <a:t>2018-09-13</a:t>
             </a:fld>
             <a:endParaRPr lang="zh-CN" altLang="en-US"/>
           </a:p>
@@ -1055,7 +1136,7 @@
           <a:p>
             <a:fld id="{54B809B6-A3A9-40A4-9A0A-11A83E6FE1C4}" type="datetimeFigureOut">
               <a:rPr lang="zh-CN" altLang="en-US" smtClean="0"/>
-              <a:t>2018-09-12</a:t>
+              <a:t>2018-09-13</a:t>
             </a:fld>
             <a:endParaRPr lang="zh-CN" altLang="en-US"/>
           </a:p>
@@ -1319,7 +1400,7 @@
           <a:p>
             <a:fld id="{54B809B6-A3A9-40A4-9A0A-11A83E6FE1C4}" type="datetimeFigureOut">
               <a:rPr lang="zh-CN" altLang="en-US" smtClean="0"/>
-              <a:t>2018-09-12</a:t>
+              <a:t>2018-09-13</a:t>
             </a:fld>
             <a:endParaRPr lang="zh-CN" altLang="en-US"/>
           </a:p>
@@ -1697,7 +1778,7 @@
           <a:p>
             <a:fld id="{54B809B6-A3A9-40A4-9A0A-11A83E6FE1C4}" type="datetimeFigureOut">
               <a:rPr lang="zh-CN" altLang="en-US" smtClean="0"/>
-              <a:t>2018-09-12</a:t>
+              <a:t>2018-09-13</a:t>
             </a:fld>
             <a:endParaRPr lang="zh-CN" altLang="en-US"/>
           </a:p>
@@ -1847,7 +1928,7 @@
           <a:p>
             <a:fld id="{54B809B6-A3A9-40A4-9A0A-11A83E6FE1C4}" type="datetimeFigureOut">
               <a:rPr lang="zh-CN" altLang="en-US" smtClean="0"/>
-              <a:t>2018-09-12</a:t>
+              <a:t>2018-09-13</a:t>
             </a:fld>
             <a:endParaRPr lang="zh-CN" altLang="en-US"/>
           </a:p>
@@ -1937,7 +2018,7 @@
           <a:p>
             <a:fld id="{54B809B6-A3A9-40A4-9A0A-11A83E6FE1C4}" type="datetimeFigureOut">
               <a:rPr lang="zh-CN" altLang="en-US" smtClean="0"/>
-              <a:t>2018-09-12</a:t>
+              <a:t>2018-09-13</a:t>
             </a:fld>
             <a:endParaRPr lang="zh-CN" altLang="en-US"/>
           </a:p>
@@ -2198,7 +2279,7 @@
           <a:p>
             <a:fld id="{54B809B6-A3A9-40A4-9A0A-11A83E6FE1C4}" type="datetimeFigureOut">
               <a:rPr lang="zh-CN" altLang="en-US" smtClean="0"/>
-              <a:t>2018-09-12</a:t>
+              <a:t>2018-09-13</a:t>
             </a:fld>
             <a:endParaRPr lang="zh-CN" altLang="en-US"/>
           </a:p>
@@ -2486,7 +2567,7 @@
           <a:p>
             <a:fld id="{54B809B6-A3A9-40A4-9A0A-11A83E6FE1C4}" type="datetimeFigureOut">
               <a:rPr lang="zh-CN" altLang="en-US" smtClean="0"/>
-              <a:t>2018-09-12</a:t>
+              <a:t>2018-09-13</a:t>
             </a:fld>
             <a:endParaRPr lang="zh-CN" altLang="en-US"/>
           </a:p>
@@ -3257,7 +3338,7 @@
           <a:p>
             <a:fld id="{54B809B6-A3A9-40A4-9A0A-11A83E6FE1C4}" type="datetimeFigureOut">
               <a:rPr lang="zh-CN" altLang="en-US" smtClean="0"/>
-              <a:t>2018-09-12</a:t>
+              <a:t>2018-09-13</a:t>
             </a:fld>
             <a:endParaRPr lang="zh-CN" altLang="en-US"/>
           </a:p>
@@ -3972,6 +4053,780 @@
           <a:p>
             <a:pPr algn="ctr"/>
             <a:r>
+              <a:rPr lang="en-US" altLang="zh-CN" dirty="0" smtClean="0"/>
+              <a:t>TAP</a:t>
+            </a:r>
+            <a:r>
+              <a:rPr lang="zh-CN" altLang="en-US" dirty="0" smtClean="0"/>
+              <a:t>外部交互图</a:t>
+            </a:r>
+            <a:endParaRPr lang="zh-CN" altLang="en-US" dirty="0"/>
+          </a:p>
+        </p:txBody>
+      </p:sp>
+      <p:pic>
+        <p:nvPicPr>
+          <p:cNvPr id="5" name="图片 4"/>
+          <p:cNvPicPr>
+            <a:picLocks noChangeAspect="1"/>
+          </p:cNvPicPr>
+          <p:nvPr/>
+        </p:nvPicPr>
+        <p:blipFill>
+          <a:blip r:embed="rId2"/>
+          <a:stretch>
+            <a:fillRect/>
+          </a:stretch>
+        </p:blipFill>
+        <p:spPr>
+          <a:xfrm>
+            <a:off x="2548040" y="1936749"/>
+            <a:ext cx="6867320" cy="5092701"/>
+          </a:xfrm>
+          <a:prstGeom prst="rect">
+            <a:avLst/>
+          </a:prstGeom>
+        </p:spPr>
+      </p:pic>
+    </p:spTree>
+    <p:extLst>
+      <p:ext uri="{BB962C8B-B14F-4D97-AF65-F5344CB8AC3E}">
+        <p14:creationId xmlns:p14="http://schemas.microsoft.com/office/powerpoint/2010/main" val="160094247"/>
+      </p:ext>
+    </p:extLst>
+  </p:cSld>
+  <p:clrMapOvr>
+    <a:masterClrMapping/>
+  </p:clrMapOvr>
+</p:sld>
+</file>
+
+<file path=ppt/slides/slide11.xml><?xml version="1.0" encoding="utf-8"?>
+<p:sld xmlns:a="http://schemas.openxmlformats.org/drawingml/2006/main" xmlns:r="http://schemas.openxmlformats.org/officeDocument/2006/relationships" xmlns:p="http://schemas.openxmlformats.org/presentationml/2006/main">
+  <p:cSld>
+    <p:spTree>
+      <p:nvGrpSpPr>
+        <p:cNvPr id="1" name=""/>
+        <p:cNvGrpSpPr/>
+        <p:nvPr/>
+      </p:nvGrpSpPr>
+      <p:grpSpPr>
+        <a:xfrm>
+          <a:off x="0" y="0"/>
+          <a:ext cx="0" cy="0"/>
+          <a:chOff x="0" y="0"/>
+          <a:chExt cx="0" cy="0"/>
+        </a:xfrm>
+      </p:grpSpPr>
+      <p:sp>
+        <p:nvSpPr>
+          <p:cNvPr id="2" name="标题 1"/>
+          <p:cNvSpPr>
+            <a:spLocks noGrp="1"/>
+          </p:cNvSpPr>
+          <p:nvPr>
+            <p:ph type="title"/>
+          </p:nvPr>
+        </p:nvSpPr>
+        <p:spPr/>
+        <p:txBody>
+          <a:bodyPr/>
+          <a:lstStyle/>
+          <a:p>
+            <a:pPr algn="ctr"/>
+            <a:r>
+              <a:rPr lang="en-US" altLang="zh-CN" dirty="0" err="1" smtClean="0"/>
+              <a:t>GNURadio</a:t>
+            </a:r>
+            <a:r>
+              <a:rPr lang="zh-CN" altLang="en-US" dirty="0" smtClean="0"/>
+              <a:t>外部交互图</a:t>
+            </a:r>
+            <a:endParaRPr lang="zh-CN" altLang="en-US" dirty="0"/>
+          </a:p>
+        </p:txBody>
+      </p:sp>
+      <p:pic>
+        <p:nvPicPr>
+          <p:cNvPr id="4" name="图片 3"/>
+          <p:cNvPicPr>
+            <a:picLocks noChangeAspect="1"/>
+          </p:cNvPicPr>
+          <p:nvPr/>
+        </p:nvPicPr>
+        <p:blipFill>
+          <a:blip r:embed="rId2"/>
+          <a:stretch>
+            <a:fillRect/>
+          </a:stretch>
+        </p:blipFill>
+        <p:spPr>
+          <a:xfrm>
+            <a:off x="2992327" y="2177288"/>
+            <a:ext cx="6004145" cy="4673600"/>
+          </a:xfrm>
+          <a:prstGeom prst="rect">
+            <a:avLst/>
+          </a:prstGeom>
+        </p:spPr>
+      </p:pic>
+    </p:spTree>
+    <p:extLst>
+      <p:ext uri="{BB962C8B-B14F-4D97-AF65-F5344CB8AC3E}">
+        <p14:creationId xmlns:p14="http://schemas.microsoft.com/office/powerpoint/2010/main" val="313124562"/>
+      </p:ext>
+    </p:extLst>
+  </p:cSld>
+  <p:clrMapOvr>
+    <a:masterClrMapping/>
+  </p:clrMapOvr>
+</p:sld>
+</file>
+
+<file path=ppt/slides/slide12.xml><?xml version="1.0" encoding="utf-8"?>
+<p:sld xmlns:a="http://schemas.openxmlformats.org/drawingml/2006/main" xmlns:r="http://schemas.openxmlformats.org/officeDocument/2006/relationships" xmlns:p="http://schemas.openxmlformats.org/presentationml/2006/main">
+  <p:cSld>
+    <p:spTree>
+      <p:nvGrpSpPr>
+        <p:cNvPr id="1" name=""/>
+        <p:cNvGrpSpPr/>
+        <p:nvPr/>
+      </p:nvGrpSpPr>
+      <p:grpSpPr>
+        <a:xfrm>
+          <a:off x="0" y="0"/>
+          <a:ext cx="0" cy="0"/>
+          <a:chOff x="0" y="0"/>
+          <a:chExt cx="0" cy="0"/>
+        </a:xfrm>
+      </p:grpSpPr>
+      <p:sp>
+        <p:nvSpPr>
+          <p:cNvPr id="2" name="标题 1"/>
+          <p:cNvSpPr>
+            <a:spLocks noGrp="1"/>
+          </p:cNvSpPr>
+          <p:nvPr>
+            <p:ph type="title"/>
+          </p:nvPr>
+        </p:nvSpPr>
+        <p:spPr/>
+        <p:txBody>
+          <a:bodyPr/>
+          <a:lstStyle/>
+          <a:p>
+            <a:pPr algn="ctr"/>
+            <a:r>
+              <a:rPr lang="en-US" altLang="zh-CN" dirty="0" err="1" smtClean="0"/>
+              <a:t>GNURadio</a:t>
+            </a:r>
+            <a:endParaRPr lang="zh-CN" altLang="en-US" dirty="0"/>
+          </a:p>
+        </p:txBody>
+      </p:sp>
+      <p:sp>
+        <p:nvSpPr>
+          <p:cNvPr id="3" name="内容占位符 2"/>
+          <p:cNvSpPr>
+            <a:spLocks noGrp="1"/>
+          </p:cNvSpPr>
+          <p:nvPr>
+            <p:ph idx="1"/>
+          </p:nvPr>
+        </p:nvSpPr>
+        <p:spPr/>
+        <p:txBody>
+          <a:bodyPr/>
+          <a:lstStyle/>
+          <a:p>
+            <a:r>
+              <a:rPr lang="zh-CN" altLang="en-US" dirty="0" smtClean="0"/>
+              <a:t>开源工程，免费</a:t>
+            </a:r>
+            <a:r>
+              <a:rPr lang="zh-CN" altLang="en-US" dirty="0"/>
+              <a:t>的软件开发工具套件。它提供信号运行和处理</a:t>
+            </a:r>
+            <a:r>
+              <a:rPr lang="zh-CN" altLang="en-US" dirty="0" smtClean="0"/>
+              <a:t>模块</a:t>
+            </a:r>
+            <a:endParaRPr lang="en-US" altLang="zh-CN" dirty="0" smtClean="0"/>
+          </a:p>
+          <a:p>
+            <a:r>
+              <a:rPr lang="en-US" altLang="zh-CN" dirty="0" smtClean="0"/>
+              <a:t>C++</a:t>
+            </a:r>
+            <a:r>
+              <a:rPr lang="zh-CN" altLang="en-US" dirty="0" smtClean="0"/>
+              <a:t>和</a:t>
+            </a:r>
+            <a:r>
+              <a:rPr lang="en-US" altLang="zh-CN" dirty="0" smtClean="0"/>
+              <a:t>python</a:t>
+            </a:r>
+            <a:r>
+              <a:rPr lang="zh-CN" altLang="en-US" dirty="0" smtClean="0"/>
+              <a:t>构成，粘合剂为</a:t>
+            </a:r>
+            <a:r>
+              <a:rPr lang="en-US" altLang="zh-CN" dirty="0" smtClean="0"/>
+              <a:t>swig</a:t>
+            </a:r>
+            <a:endParaRPr lang="zh-CN" altLang="en-US" dirty="0"/>
+          </a:p>
+        </p:txBody>
+      </p:sp>
+    </p:spTree>
+    <p:extLst>
+      <p:ext uri="{BB962C8B-B14F-4D97-AF65-F5344CB8AC3E}">
+        <p14:creationId xmlns:p14="http://schemas.microsoft.com/office/powerpoint/2010/main" val="3622553357"/>
+      </p:ext>
+    </p:extLst>
+  </p:cSld>
+  <p:clrMapOvr>
+    <a:masterClrMapping/>
+  </p:clrMapOvr>
+</p:sld>
+</file>
+
+<file path=ppt/slides/slide13.xml><?xml version="1.0" encoding="utf-8"?>
+<p:sld xmlns:a="http://schemas.openxmlformats.org/drawingml/2006/main" xmlns:r="http://schemas.openxmlformats.org/officeDocument/2006/relationships" xmlns:p="http://schemas.openxmlformats.org/presentationml/2006/main">
+  <p:cSld>
+    <p:spTree>
+      <p:nvGrpSpPr>
+        <p:cNvPr id="1" name=""/>
+        <p:cNvGrpSpPr/>
+        <p:nvPr/>
+      </p:nvGrpSpPr>
+      <p:grpSpPr>
+        <a:xfrm>
+          <a:off x="0" y="0"/>
+          <a:ext cx="0" cy="0"/>
+          <a:chOff x="0" y="0"/>
+          <a:chExt cx="0" cy="0"/>
+        </a:xfrm>
+      </p:grpSpPr>
+      <p:sp>
+        <p:nvSpPr>
+          <p:cNvPr id="2" name="标题 1"/>
+          <p:cNvSpPr>
+            <a:spLocks noGrp="1"/>
+          </p:cNvSpPr>
+          <p:nvPr>
+            <p:ph type="title"/>
+          </p:nvPr>
+        </p:nvSpPr>
+        <p:spPr/>
+        <p:txBody>
+          <a:bodyPr/>
+          <a:lstStyle/>
+          <a:p>
+            <a:pPr algn="ctr"/>
+            <a:r>
+              <a:rPr lang="en-US" altLang="zh-CN" dirty="0" smtClean="0"/>
+              <a:t>TAP</a:t>
+            </a:r>
+            <a:endParaRPr lang="zh-CN" altLang="en-US" dirty="0"/>
+          </a:p>
+        </p:txBody>
+      </p:sp>
+      <p:sp>
+        <p:nvSpPr>
+          <p:cNvPr id="3" name="内容占位符 2"/>
+          <p:cNvSpPr>
+            <a:spLocks noGrp="1"/>
+          </p:cNvSpPr>
+          <p:nvPr>
+            <p:ph idx="1"/>
+          </p:nvPr>
+        </p:nvSpPr>
+        <p:spPr/>
+        <p:txBody>
+          <a:bodyPr/>
+          <a:lstStyle/>
+          <a:p>
+            <a:r>
+              <a:rPr lang="en-US" altLang="zh-CN" dirty="0" smtClean="0"/>
+              <a:t>Linux</a:t>
+            </a:r>
+            <a:r>
+              <a:rPr lang="zh-CN" altLang="en-US" dirty="0" smtClean="0"/>
+              <a:t>中用户态的虚拟网卡</a:t>
+            </a:r>
+            <a:endParaRPr lang="en-US" altLang="zh-CN" dirty="0" smtClean="0"/>
+          </a:p>
+          <a:p>
+            <a:r>
+              <a:rPr lang="zh-CN" altLang="en-US" dirty="0"/>
+              <a:t>可用</a:t>
+            </a:r>
+            <a:r>
+              <a:rPr lang="zh-CN" altLang="en-US" dirty="0" smtClean="0"/>
+              <a:t>于构建自组网</a:t>
+            </a:r>
+            <a:endParaRPr lang="en-US" altLang="zh-CN" dirty="0" smtClean="0"/>
+          </a:p>
+          <a:p>
+            <a:r>
+              <a:rPr lang="zh-CN" altLang="en-US" dirty="0" smtClean="0"/>
+              <a:t>应用场景</a:t>
+            </a:r>
+            <a:endParaRPr lang="en-US" altLang="zh-CN" dirty="0" smtClean="0"/>
+          </a:p>
+          <a:p>
+            <a:pPr marL="0" indent="0">
+              <a:buNone/>
+            </a:pPr>
+            <a:r>
+              <a:rPr lang="en-US" altLang="zh-CN" dirty="0"/>
+              <a:t> </a:t>
+            </a:r>
+            <a:r>
+              <a:rPr lang="en-US" altLang="zh-CN" dirty="0" smtClean="0"/>
+              <a:t>      </a:t>
+            </a:r>
+            <a:r>
+              <a:rPr lang="zh-CN" altLang="en-US" dirty="0" smtClean="0"/>
+              <a:t>虚拟机的桥接和</a:t>
+            </a:r>
+            <a:r>
+              <a:rPr lang="en-US" altLang="zh-CN" dirty="0" smtClean="0"/>
+              <a:t>NAT</a:t>
+            </a:r>
+            <a:r>
+              <a:rPr lang="zh-CN" altLang="en-US" dirty="0" smtClean="0"/>
+              <a:t>模式</a:t>
+            </a:r>
+            <a:endParaRPr lang="zh-CN" altLang="en-US" dirty="0"/>
+          </a:p>
+        </p:txBody>
+      </p:sp>
+    </p:spTree>
+    <p:extLst>
+      <p:ext uri="{BB962C8B-B14F-4D97-AF65-F5344CB8AC3E}">
+        <p14:creationId xmlns:p14="http://schemas.microsoft.com/office/powerpoint/2010/main" val="534785431"/>
+      </p:ext>
+    </p:extLst>
+  </p:cSld>
+  <p:clrMapOvr>
+    <a:masterClrMapping/>
+  </p:clrMapOvr>
+</p:sld>
+</file>
+
+<file path=ppt/slides/slide14.xml><?xml version="1.0" encoding="utf-8"?>
+<p:sld xmlns:a="http://schemas.openxmlformats.org/drawingml/2006/main" xmlns:r="http://schemas.openxmlformats.org/officeDocument/2006/relationships" xmlns:p="http://schemas.openxmlformats.org/presentationml/2006/main">
+  <p:cSld>
+    <p:spTree>
+      <p:nvGrpSpPr>
+        <p:cNvPr id="1" name=""/>
+        <p:cNvGrpSpPr/>
+        <p:nvPr/>
+      </p:nvGrpSpPr>
+      <p:grpSpPr>
+        <a:xfrm>
+          <a:off x="0" y="0"/>
+          <a:ext cx="0" cy="0"/>
+          <a:chOff x="0" y="0"/>
+          <a:chExt cx="0" cy="0"/>
+        </a:xfrm>
+      </p:grpSpPr>
+      <p:sp>
+        <p:nvSpPr>
+          <p:cNvPr id="2" name="标题 1"/>
+          <p:cNvSpPr>
+            <a:spLocks noGrp="1"/>
+          </p:cNvSpPr>
+          <p:nvPr>
+            <p:ph type="title"/>
+          </p:nvPr>
+        </p:nvSpPr>
+        <p:spPr/>
+        <p:txBody>
+          <a:bodyPr/>
+          <a:lstStyle/>
+          <a:p>
+            <a:pPr algn="ctr"/>
+            <a:r>
+              <a:rPr lang="en-US" altLang="zh-CN" dirty="0" smtClean="0"/>
+              <a:t>TAP</a:t>
+            </a:r>
+            <a:r>
+              <a:rPr lang="zh-CN" altLang="en-US" dirty="0" smtClean="0"/>
+              <a:t>构建自组网</a:t>
+            </a:r>
+            <a:endParaRPr lang="zh-CN" altLang="en-US" dirty="0"/>
+          </a:p>
+        </p:txBody>
+      </p:sp>
+      <p:sp>
+        <p:nvSpPr>
+          <p:cNvPr id="3" name="内容占位符 2"/>
+          <p:cNvSpPr>
+            <a:spLocks noGrp="1"/>
+          </p:cNvSpPr>
+          <p:nvPr>
+            <p:ph idx="1"/>
+          </p:nvPr>
+        </p:nvSpPr>
+        <p:spPr/>
+        <p:txBody>
+          <a:bodyPr/>
+          <a:lstStyle/>
+          <a:p>
+            <a:r>
+              <a:rPr lang="zh-CN" altLang="en-US" dirty="0" smtClean="0"/>
+              <a:t>发送收到的均为以太网帧</a:t>
+            </a:r>
+            <a:endParaRPr lang="en-US" altLang="zh-CN" dirty="0" smtClean="0"/>
+          </a:p>
+          <a:p>
+            <a:r>
+              <a:rPr lang="zh-CN" altLang="en-US" dirty="0" smtClean="0"/>
+              <a:t>自定义</a:t>
+            </a:r>
+            <a:r>
+              <a:rPr lang="en-US" altLang="zh-CN" dirty="0" smtClean="0"/>
+              <a:t>TCP/IP</a:t>
+            </a:r>
+            <a:r>
+              <a:rPr lang="zh-CN" altLang="en-US" dirty="0" smtClean="0"/>
+              <a:t>协议栈</a:t>
+            </a:r>
+            <a:endParaRPr lang="zh-CN" altLang="en-US" dirty="0"/>
+          </a:p>
+        </p:txBody>
+      </p:sp>
+    </p:spTree>
+    <p:extLst>
+      <p:ext uri="{BB962C8B-B14F-4D97-AF65-F5344CB8AC3E}">
+        <p14:creationId xmlns:p14="http://schemas.microsoft.com/office/powerpoint/2010/main" val="2717899466"/>
+      </p:ext>
+    </p:extLst>
+  </p:cSld>
+  <p:clrMapOvr>
+    <a:masterClrMapping/>
+  </p:clrMapOvr>
+</p:sld>
+</file>
+
+<file path=ppt/slides/slide15.xml><?xml version="1.0" encoding="utf-8"?>
+<p:sld xmlns:a="http://schemas.openxmlformats.org/drawingml/2006/main" xmlns:r="http://schemas.openxmlformats.org/officeDocument/2006/relationships" xmlns:p="http://schemas.openxmlformats.org/presentationml/2006/main">
+  <p:cSld>
+    <p:spTree>
+      <p:nvGrpSpPr>
+        <p:cNvPr id="1" name=""/>
+        <p:cNvGrpSpPr/>
+        <p:nvPr/>
+      </p:nvGrpSpPr>
+      <p:grpSpPr>
+        <a:xfrm>
+          <a:off x="0" y="0"/>
+          <a:ext cx="0" cy="0"/>
+          <a:chOff x="0" y="0"/>
+          <a:chExt cx="0" cy="0"/>
+        </a:xfrm>
+      </p:grpSpPr>
+      <p:sp>
+        <p:nvSpPr>
+          <p:cNvPr id="2" name="标题 1"/>
+          <p:cNvSpPr>
+            <a:spLocks noGrp="1"/>
+          </p:cNvSpPr>
+          <p:nvPr>
+            <p:ph type="title"/>
+          </p:nvPr>
+        </p:nvSpPr>
+        <p:spPr/>
+        <p:txBody>
+          <a:bodyPr/>
+          <a:lstStyle/>
+          <a:p>
+            <a:pPr algn="ctr"/>
+            <a:r>
+              <a:rPr lang="en-US" altLang="zh-CN" dirty="0" smtClean="0"/>
+              <a:t>OFDM</a:t>
+            </a:r>
+            <a:r>
+              <a:rPr lang="zh-CN" altLang="en-US" dirty="0" smtClean="0"/>
+              <a:t>涉及到的相关参数</a:t>
+            </a:r>
+            <a:endParaRPr lang="zh-CN" altLang="en-US" dirty="0"/>
+          </a:p>
+        </p:txBody>
+      </p:sp>
+      <p:sp>
+        <p:nvSpPr>
+          <p:cNvPr id="3" name="内容占位符 2"/>
+          <p:cNvSpPr>
+            <a:spLocks noGrp="1"/>
+          </p:cNvSpPr>
+          <p:nvPr>
+            <p:ph idx="1"/>
+          </p:nvPr>
+        </p:nvSpPr>
+        <p:spPr/>
+        <p:txBody>
+          <a:bodyPr/>
+          <a:lstStyle/>
+          <a:p>
+            <a:r>
+              <a:rPr lang="en-US" altLang="zh-CN" dirty="0" smtClean="0"/>
+              <a:t>The </a:t>
+            </a:r>
+            <a:r>
+              <a:rPr lang="en-US" altLang="zh-CN" dirty="0"/>
+              <a:t>number of FFT </a:t>
+            </a:r>
+            <a:r>
+              <a:rPr lang="en-US" altLang="zh-CN" dirty="0" smtClean="0"/>
+              <a:t>bins </a:t>
+            </a:r>
+            <a:r>
+              <a:rPr lang="zh-CN" altLang="en-US" dirty="0" smtClean="0"/>
+              <a:t>： </a:t>
+            </a:r>
+            <a:r>
+              <a:rPr lang="en-US" altLang="zh-CN" dirty="0" smtClean="0"/>
+              <a:t>FFT</a:t>
+            </a:r>
+            <a:r>
+              <a:rPr lang="zh-CN" altLang="en-US" dirty="0"/>
+              <a:t>（快速傅里叶变换</a:t>
+            </a:r>
+            <a:r>
+              <a:rPr lang="zh-CN" altLang="en-US" dirty="0" smtClean="0"/>
+              <a:t>）</a:t>
+            </a:r>
+            <a:endParaRPr lang="en-US" altLang="zh-CN" dirty="0" smtClean="0"/>
+          </a:p>
+          <a:p>
+            <a:r>
+              <a:rPr lang="en-US" altLang="zh-CN" dirty="0"/>
+              <a:t>T</a:t>
+            </a:r>
+            <a:r>
+              <a:rPr lang="en-US" altLang="zh-CN" dirty="0" smtClean="0"/>
+              <a:t>he </a:t>
+            </a:r>
+            <a:r>
+              <a:rPr lang="en-US" altLang="zh-CN" dirty="0"/>
+              <a:t>number of bits in the cyclic </a:t>
+            </a:r>
+            <a:r>
+              <a:rPr lang="en-US" altLang="zh-CN" dirty="0" smtClean="0"/>
+              <a:t>prefix</a:t>
+            </a:r>
+          </a:p>
+          <a:p>
+            <a:r>
+              <a:rPr lang="en-US" altLang="zh-CN" dirty="0" smtClean="0"/>
+              <a:t>The </a:t>
+            </a:r>
+            <a:r>
+              <a:rPr lang="en-US" altLang="zh-CN" dirty="0"/>
+              <a:t>number of occupied FFT </a:t>
+            </a:r>
+            <a:r>
+              <a:rPr lang="en-US" altLang="zh-CN" dirty="0" smtClean="0"/>
+              <a:t>bins</a:t>
+            </a:r>
+          </a:p>
+          <a:p>
+            <a:r>
+              <a:rPr lang="en-US" altLang="zh-CN" dirty="0"/>
+              <a:t>SNR </a:t>
+            </a:r>
+            <a:r>
+              <a:rPr lang="en-US" altLang="zh-CN" dirty="0" smtClean="0"/>
+              <a:t>estimate</a:t>
+            </a:r>
+          </a:p>
+          <a:p>
+            <a:r>
+              <a:rPr lang="en-US" altLang="zh-CN" dirty="0" smtClean="0"/>
+              <a:t>Carrier </a:t>
+            </a:r>
+            <a:r>
+              <a:rPr lang="en-US" altLang="zh-CN" dirty="0"/>
+              <a:t>detect threshold (dB</a:t>
+            </a:r>
+            <a:r>
+              <a:rPr lang="en-US" altLang="zh-CN" dirty="0" smtClean="0"/>
+              <a:t>)</a:t>
+            </a:r>
+            <a:r>
+              <a:rPr lang="zh-CN" altLang="en-US" dirty="0"/>
+              <a:t>（载波检测门限）</a:t>
+            </a:r>
+            <a:endParaRPr lang="en-US" altLang="zh-CN" dirty="0" smtClean="0"/>
+          </a:p>
+          <a:p>
+            <a:r>
+              <a:rPr lang="en-US" altLang="zh-CN" dirty="0" smtClean="0"/>
+              <a:t>Transmitter </a:t>
+            </a:r>
+            <a:r>
+              <a:rPr lang="en-US" altLang="zh-CN" dirty="0"/>
+              <a:t>digital </a:t>
+            </a:r>
+            <a:r>
+              <a:rPr lang="en-US" altLang="zh-CN" dirty="0" smtClean="0"/>
+              <a:t>amplitude</a:t>
+            </a:r>
+          </a:p>
+          <a:p>
+            <a:r>
+              <a:rPr lang="zh-CN" altLang="en-US" dirty="0" smtClean="0"/>
+              <a:t>采样率</a:t>
+            </a:r>
+            <a:endParaRPr lang="en-US" altLang="zh-CN" dirty="0" smtClean="0"/>
+          </a:p>
+          <a:p>
+            <a:r>
+              <a:rPr lang="zh-CN" altLang="en-US" dirty="0"/>
+              <a:t>其它</a:t>
+            </a:r>
+            <a:endParaRPr lang="en-US" altLang="zh-CN" dirty="0" smtClean="0"/>
+          </a:p>
+          <a:p>
+            <a:endParaRPr lang="zh-CN" altLang="en-US" dirty="0"/>
+          </a:p>
+        </p:txBody>
+      </p:sp>
+    </p:spTree>
+    <p:extLst>
+      <p:ext uri="{BB962C8B-B14F-4D97-AF65-F5344CB8AC3E}">
+        <p14:creationId xmlns:p14="http://schemas.microsoft.com/office/powerpoint/2010/main" val="2954760496"/>
+      </p:ext>
+    </p:extLst>
+  </p:cSld>
+  <p:clrMapOvr>
+    <a:masterClrMapping/>
+  </p:clrMapOvr>
+</p:sld>
+</file>
+
+<file path=ppt/slides/slide16.xml><?xml version="1.0" encoding="utf-8"?>
+<p:sld xmlns:a="http://schemas.openxmlformats.org/drawingml/2006/main" xmlns:r="http://schemas.openxmlformats.org/officeDocument/2006/relationships" xmlns:p="http://schemas.openxmlformats.org/presentationml/2006/main">
+  <p:cSld>
+    <p:spTree>
+      <p:nvGrpSpPr>
+        <p:cNvPr id="1" name=""/>
+        <p:cNvGrpSpPr/>
+        <p:nvPr/>
+      </p:nvGrpSpPr>
+      <p:grpSpPr>
+        <a:xfrm>
+          <a:off x="0" y="0"/>
+          <a:ext cx="0" cy="0"/>
+          <a:chOff x="0" y="0"/>
+          <a:chExt cx="0" cy="0"/>
+        </a:xfrm>
+      </p:grpSpPr>
+      <p:sp>
+        <p:nvSpPr>
+          <p:cNvPr id="2" name="标题 1"/>
+          <p:cNvSpPr>
+            <a:spLocks noGrp="1"/>
+          </p:cNvSpPr>
+          <p:nvPr>
+            <p:ph type="title"/>
+          </p:nvPr>
+        </p:nvSpPr>
+        <p:spPr/>
+        <p:txBody>
+          <a:bodyPr/>
+          <a:lstStyle/>
+          <a:p>
+            <a:pPr algn="ctr"/>
+            <a:r>
+              <a:rPr lang="zh-CN" altLang="en-US" dirty="0" smtClean="0"/>
+              <a:t>目得</a:t>
+            </a:r>
+            <a:endParaRPr lang="zh-CN" altLang="en-US" dirty="0"/>
+          </a:p>
+        </p:txBody>
+      </p:sp>
+      <p:sp>
+        <p:nvSpPr>
+          <p:cNvPr id="3" name="内容占位符 2"/>
+          <p:cNvSpPr>
+            <a:spLocks noGrp="1"/>
+          </p:cNvSpPr>
+          <p:nvPr>
+            <p:ph idx="1"/>
+          </p:nvPr>
+        </p:nvSpPr>
+        <p:spPr/>
+        <p:txBody>
+          <a:bodyPr/>
+          <a:lstStyle/>
+          <a:p>
+            <a:r>
+              <a:rPr lang="zh-CN" altLang="en-US" dirty="0" smtClean="0"/>
+              <a:t>怎样达到软件参数最优</a:t>
+            </a:r>
+            <a:endParaRPr lang="en-US" altLang="zh-CN" dirty="0" smtClean="0"/>
+          </a:p>
+          <a:p>
+            <a:r>
+              <a:rPr lang="zh-CN" altLang="en-US" dirty="0" smtClean="0"/>
+              <a:t>怎样达到硬件参数最优</a:t>
+            </a:r>
+            <a:endParaRPr lang="zh-CN" altLang="en-US" dirty="0"/>
+          </a:p>
+        </p:txBody>
+      </p:sp>
+    </p:spTree>
+    <p:extLst>
+      <p:ext uri="{BB962C8B-B14F-4D97-AF65-F5344CB8AC3E}">
+        <p14:creationId xmlns:p14="http://schemas.microsoft.com/office/powerpoint/2010/main" val="1604086119"/>
+      </p:ext>
+    </p:extLst>
+  </p:cSld>
+  <p:clrMapOvr>
+    <a:masterClrMapping/>
+  </p:clrMapOvr>
+</p:sld>
+</file>
+
+<file path=ppt/slides/slide17.xml><?xml version="1.0" encoding="utf-8"?>
+<p:sld xmlns:a="http://schemas.openxmlformats.org/drawingml/2006/main" xmlns:r="http://schemas.openxmlformats.org/officeDocument/2006/relationships" xmlns:p="http://schemas.openxmlformats.org/presentationml/2006/main">
+  <p:cSld>
+    <p:spTree>
+      <p:nvGrpSpPr>
+        <p:cNvPr id="1" name=""/>
+        <p:cNvGrpSpPr/>
+        <p:nvPr/>
+      </p:nvGrpSpPr>
+      <p:grpSpPr>
+        <a:xfrm>
+          <a:off x="0" y="0"/>
+          <a:ext cx="0" cy="0"/>
+          <a:chOff x="0" y="0"/>
+          <a:chExt cx="0" cy="0"/>
+        </a:xfrm>
+      </p:grpSpPr>
+      <p:sp>
+        <p:nvSpPr>
+          <p:cNvPr id="2" name="标题 1"/>
+          <p:cNvSpPr>
+            <a:spLocks noGrp="1"/>
+          </p:cNvSpPr>
+          <p:nvPr>
+            <p:ph type="title"/>
+          </p:nvPr>
+        </p:nvSpPr>
+        <p:spPr/>
+        <p:txBody>
+          <a:bodyPr/>
+          <a:lstStyle/>
+          <a:p>
+            <a:pPr algn="ctr"/>
+            <a:r>
               <a:rPr lang="zh-CN" altLang="en-US" dirty="0" smtClean="0"/>
               <a:t>测试场景</a:t>
             </a:r>
@@ -4023,7 +4878,7 @@
 </p:sld>
 </file>
 
-<file path=ppt/slides/slide11.xml><?xml version="1.0" encoding="utf-8"?>
+<file path=ppt/slides/slide18.xml><?xml version="1.0" encoding="utf-8"?>
 <p:sld xmlns:a="http://schemas.openxmlformats.org/drawingml/2006/main" xmlns:r="http://schemas.openxmlformats.org/officeDocument/2006/relationships" xmlns:p="http://schemas.openxmlformats.org/presentationml/2006/main">
   <p:cSld>
     <p:spTree>
@@ -4101,7 +4956,7 @@
 </p:sld>
 </file>
 
-<file path=ppt/slides/slide12.xml><?xml version="1.0" encoding="utf-8"?>
+<file path=ppt/slides/slide19.xml><?xml version="1.0" encoding="utf-8"?>
 <p:sld xmlns:a="http://schemas.openxmlformats.org/drawingml/2006/main" xmlns:r="http://schemas.openxmlformats.org/officeDocument/2006/relationships" xmlns:p="http://schemas.openxmlformats.org/presentationml/2006/main">
   <p:cSld>
     <p:spTree>
@@ -4133,6 +4988,347 @@
           <a:bodyPr/>
           <a:lstStyle/>
           <a:p>
+            <a:r>
+              <a:rPr lang="zh-CN" altLang="en-US" dirty="0"/>
+              <a:t>实验结果</a:t>
+            </a:r>
+            <a:r>
+              <a:rPr lang="zh-CN" altLang="en-US" dirty="0" smtClean="0"/>
+              <a:t>（二）</a:t>
+            </a:r>
+            <a:endParaRPr lang="zh-CN" altLang="en-US" dirty="0"/>
+          </a:p>
+        </p:txBody>
+      </p:sp>
+      <p:sp>
+        <p:nvSpPr>
+          <p:cNvPr id="3" name="内容占位符 2"/>
+          <p:cNvSpPr>
+            <a:spLocks noGrp="1"/>
+          </p:cNvSpPr>
+          <p:nvPr>
+            <p:ph idx="1"/>
+          </p:nvPr>
+        </p:nvSpPr>
+        <p:spPr/>
+        <p:txBody>
+          <a:bodyPr/>
+          <a:lstStyle/>
+          <a:p>
+            <a:r>
+              <a:rPr lang="zh-CN" altLang="en-US" dirty="0" smtClean="0"/>
+              <a:t>抓包文件见附件</a:t>
+            </a:r>
+            <a:r>
+              <a:rPr lang="en-US" altLang="zh-CN" dirty="0"/>
+              <a:t>`</a:t>
+            </a:r>
+            <a:r>
+              <a:rPr lang="en-US" altLang="zh-CN" dirty="0" err="1"/>
+              <a:t>caption.cap</a:t>
+            </a:r>
+            <a:r>
+              <a:rPr lang="en-US" altLang="zh-CN" dirty="0"/>
+              <a:t>`</a:t>
+            </a:r>
+            <a:endParaRPr lang="zh-CN" altLang="en-US" dirty="0"/>
+          </a:p>
+        </p:txBody>
+      </p:sp>
+    </p:spTree>
+    <p:extLst>
+      <p:ext uri="{BB962C8B-B14F-4D97-AF65-F5344CB8AC3E}">
+        <p14:creationId xmlns:p14="http://schemas.microsoft.com/office/powerpoint/2010/main" val="1040040792"/>
+      </p:ext>
+    </p:extLst>
+  </p:cSld>
+  <p:clrMapOvr>
+    <a:masterClrMapping/>
+  </p:clrMapOvr>
+</p:sld>
+</file>
+
+<file path=ppt/slides/slide2.xml><?xml version="1.0" encoding="utf-8"?>
+<p:sld xmlns:a="http://schemas.openxmlformats.org/drawingml/2006/main" xmlns:r="http://schemas.openxmlformats.org/officeDocument/2006/relationships" xmlns:p="http://schemas.openxmlformats.org/presentationml/2006/main">
+  <p:cSld>
+    <p:spTree>
+      <p:nvGrpSpPr>
+        <p:cNvPr id="1" name=""/>
+        <p:cNvGrpSpPr/>
+        <p:nvPr/>
+      </p:nvGrpSpPr>
+      <p:grpSpPr>
+        <a:xfrm>
+          <a:off x="0" y="0"/>
+          <a:ext cx="0" cy="0"/>
+          <a:chOff x="0" y="0"/>
+          <a:chExt cx="0" cy="0"/>
+        </a:xfrm>
+      </p:grpSpPr>
+      <p:sp>
+        <p:nvSpPr>
+          <p:cNvPr id="2" name="标题 1"/>
+          <p:cNvSpPr>
+            <a:spLocks noGrp="1"/>
+          </p:cNvSpPr>
+          <p:nvPr>
+            <p:ph type="title"/>
+          </p:nvPr>
+        </p:nvSpPr>
+        <p:spPr/>
+        <p:txBody>
+          <a:bodyPr/>
+          <a:lstStyle/>
+          <a:p>
+            <a:pPr algn="ctr"/>
+            <a:r>
+              <a:rPr lang="zh-CN" altLang="en-US" dirty="0" smtClean="0"/>
+              <a:t>主要内容</a:t>
+            </a:r>
+            <a:endParaRPr lang="zh-CN" altLang="en-US" dirty="0"/>
+          </a:p>
+        </p:txBody>
+      </p:sp>
+      <p:sp>
+        <p:nvSpPr>
+          <p:cNvPr id="3" name="内容占位符 2"/>
+          <p:cNvSpPr>
+            <a:spLocks noGrp="1"/>
+          </p:cNvSpPr>
+          <p:nvPr>
+            <p:ph idx="1"/>
+          </p:nvPr>
+        </p:nvSpPr>
+        <p:spPr/>
+        <p:txBody>
+          <a:bodyPr/>
+          <a:lstStyle/>
+          <a:p>
+            <a:r>
+              <a:rPr lang="zh-CN" altLang="en-US" dirty="0" smtClean="0"/>
+              <a:t>分阶段</a:t>
+            </a:r>
+            <a:endParaRPr lang="en-US" altLang="zh-CN" dirty="0" smtClean="0"/>
+          </a:p>
+          <a:p>
+            <a:r>
+              <a:rPr lang="zh-CN" altLang="en-US" dirty="0" smtClean="0"/>
+              <a:t>硬件构成</a:t>
+            </a:r>
+            <a:endParaRPr lang="en-US" altLang="zh-CN" dirty="0" smtClean="0"/>
+          </a:p>
+          <a:p>
+            <a:r>
+              <a:rPr lang="zh-CN" altLang="en-US" dirty="0" smtClean="0"/>
+              <a:t>软件框架（</a:t>
+            </a:r>
+            <a:r>
+              <a:rPr lang="en-US" altLang="zh-CN" dirty="0" err="1" smtClean="0"/>
+              <a:t>bpsk</a:t>
+            </a:r>
+            <a:r>
+              <a:rPr lang="en-US" altLang="zh-CN" dirty="0" smtClean="0"/>
+              <a:t>/</a:t>
+            </a:r>
+            <a:r>
+              <a:rPr lang="en-US" altLang="zh-CN" dirty="0" err="1" smtClean="0"/>
+              <a:t>qpsk</a:t>
+            </a:r>
+            <a:r>
+              <a:rPr lang="zh-CN" altLang="en-US" dirty="0" smtClean="0"/>
+              <a:t>实现的</a:t>
+            </a:r>
+            <a:r>
+              <a:rPr lang="en-US" altLang="zh-CN" dirty="0" smtClean="0"/>
+              <a:t>OFDM</a:t>
+            </a:r>
+            <a:r>
+              <a:rPr lang="zh-CN" altLang="en-US" dirty="0" smtClean="0"/>
+              <a:t>，以及虚拟网卡</a:t>
+            </a:r>
+            <a:r>
+              <a:rPr lang="en-US" altLang="zh-CN" dirty="0" smtClean="0"/>
+              <a:t>Tap</a:t>
+            </a:r>
+            <a:r>
+              <a:rPr lang="zh-CN" altLang="en-US" dirty="0" smtClean="0"/>
+              <a:t>）</a:t>
+            </a:r>
+            <a:endParaRPr lang="en-US" altLang="zh-CN" dirty="0" smtClean="0"/>
+          </a:p>
+          <a:p>
+            <a:r>
+              <a:rPr lang="zh-CN" altLang="en-US" dirty="0" smtClean="0"/>
+              <a:t>测试场景</a:t>
+            </a:r>
+            <a:endParaRPr lang="en-US" altLang="zh-CN" dirty="0" smtClean="0"/>
+          </a:p>
+          <a:p>
+            <a:r>
+              <a:rPr lang="en-US" altLang="zh-CN" dirty="0" smtClean="0"/>
+              <a:t>ping</a:t>
+            </a:r>
+            <a:r>
+              <a:rPr lang="zh-CN" altLang="en-US" dirty="0" smtClean="0"/>
+              <a:t>测试通信延迟</a:t>
+            </a:r>
+            <a:endParaRPr lang="en-US" altLang="zh-CN" dirty="0" smtClean="0"/>
+          </a:p>
+          <a:p>
+            <a:r>
+              <a:rPr lang="zh-CN" altLang="en-US" dirty="0" smtClean="0"/>
+              <a:t>目前存在的问题</a:t>
+            </a:r>
+            <a:endParaRPr lang="en-US" altLang="zh-CN" dirty="0" smtClean="0"/>
+          </a:p>
+          <a:p>
+            <a:endParaRPr lang="en-US" altLang="zh-CN" dirty="0" smtClean="0"/>
+          </a:p>
+        </p:txBody>
+      </p:sp>
+    </p:spTree>
+    <p:extLst>
+      <p:ext uri="{BB962C8B-B14F-4D97-AF65-F5344CB8AC3E}">
+        <p14:creationId xmlns:p14="http://schemas.microsoft.com/office/powerpoint/2010/main" val="1697157127"/>
+      </p:ext>
+    </p:extLst>
+  </p:cSld>
+  <p:clrMapOvr>
+    <a:masterClrMapping/>
+  </p:clrMapOvr>
+</p:sld>
+</file>
+
+<file path=ppt/slides/slide20.xml><?xml version="1.0" encoding="utf-8"?>
+<p:sld xmlns:a="http://schemas.openxmlformats.org/drawingml/2006/main" xmlns:r="http://schemas.openxmlformats.org/officeDocument/2006/relationships" xmlns:p="http://schemas.openxmlformats.org/presentationml/2006/main">
+  <p:cSld>
+    <p:spTree>
+      <p:nvGrpSpPr>
+        <p:cNvPr id="1" name=""/>
+        <p:cNvGrpSpPr/>
+        <p:nvPr/>
+      </p:nvGrpSpPr>
+      <p:grpSpPr>
+        <a:xfrm>
+          <a:off x="0" y="0"/>
+          <a:ext cx="0" cy="0"/>
+          <a:chOff x="0" y="0"/>
+          <a:chExt cx="0" cy="0"/>
+        </a:xfrm>
+      </p:grpSpPr>
+      <p:sp>
+        <p:nvSpPr>
+          <p:cNvPr id="2" name="标题 1"/>
+          <p:cNvSpPr>
+            <a:spLocks noGrp="1"/>
+          </p:cNvSpPr>
+          <p:nvPr>
+            <p:ph type="title"/>
+          </p:nvPr>
+        </p:nvSpPr>
+        <p:spPr/>
+        <p:txBody>
+          <a:bodyPr/>
+          <a:lstStyle/>
+          <a:p>
+            <a:pPr algn="ctr"/>
+            <a:r>
+              <a:rPr lang="zh-CN" altLang="en-US" dirty="0" smtClean="0"/>
+              <a:t>实验结果分析</a:t>
+            </a:r>
+            <a:endParaRPr lang="zh-CN" altLang="en-US" dirty="0"/>
+          </a:p>
+        </p:txBody>
+      </p:sp>
+      <p:sp>
+        <p:nvSpPr>
+          <p:cNvPr id="3" name="内容占位符 2"/>
+          <p:cNvSpPr>
+            <a:spLocks noGrp="1"/>
+          </p:cNvSpPr>
+          <p:nvPr>
+            <p:ph idx="1"/>
+          </p:nvPr>
+        </p:nvSpPr>
+        <p:spPr/>
+        <p:txBody>
+          <a:bodyPr/>
+          <a:lstStyle/>
+          <a:p>
+            <a:r>
+              <a:rPr lang="zh-CN" altLang="en-US" dirty="0" smtClean="0"/>
+              <a:t>距离远近和丢包</a:t>
+            </a:r>
+            <a:endParaRPr lang="en-US" altLang="zh-CN" dirty="0" smtClean="0"/>
+          </a:p>
+          <a:p>
+            <a:r>
+              <a:rPr lang="zh-CN" altLang="en-US" dirty="0" smtClean="0"/>
+              <a:t>出现大量重复包</a:t>
+            </a:r>
+            <a:endParaRPr lang="en-US" altLang="zh-CN" dirty="0" smtClean="0"/>
+          </a:p>
+          <a:p>
+            <a:r>
+              <a:rPr lang="zh-CN" altLang="en-US" dirty="0" smtClean="0"/>
+              <a:t>延迟高</a:t>
+            </a:r>
+            <a:endParaRPr lang="en-US" altLang="zh-CN" dirty="0" smtClean="0"/>
+          </a:p>
+          <a:p>
+            <a:r>
+              <a:rPr lang="zh-CN" altLang="en-US" dirty="0" smtClean="0"/>
+              <a:t>刚开始延迟高于稳定后延迟</a:t>
+            </a:r>
+            <a:endParaRPr lang="zh-CN" altLang="en-US" dirty="0"/>
+          </a:p>
+        </p:txBody>
+      </p:sp>
+    </p:spTree>
+    <p:extLst>
+      <p:ext uri="{BB962C8B-B14F-4D97-AF65-F5344CB8AC3E}">
+        <p14:creationId xmlns:p14="http://schemas.microsoft.com/office/powerpoint/2010/main" val="2314493848"/>
+      </p:ext>
+    </p:extLst>
+  </p:cSld>
+  <p:clrMapOvr>
+    <a:masterClrMapping/>
+  </p:clrMapOvr>
+</p:sld>
+</file>
+
+<file path=ppt/slides/slide21.xml><?xml version="1.0" encoding="utf-8"?>
+<p:sld xmlns:a="http://schemas.openxmlformats.org/drawingml/2006/main" xmlns:r="http://schemas.openxmlformats.org/officeDocument/2006/relationships" xmlns:p="http://schemas.openxmlformats.org/presentationml/2006/main">
+  <p:cSld>
+    <p:spTree>
+      <p:nvGrpSpPr>
+        <p:cNvPr id="1" name=""/>
+        <p:cNvGrpSpPr/>
+        <p:nvPr/>
+      </p:nvGrpSpPr>
+      <p:grpSpPr>
+        <a:xfrm>
+          <a:off x="0" y="0"/>
+          <a:ext cx="0" cy="0"/>
+          <a:chOff x="0" y="0"/>
+          <a:chExt cx="0" cy="0"/>
+        </a:xfrm>
+      </p:grpSpPr>
+      <p:sp>
+        <p:nvSpPr>
+          <p:cNvPr id="2" name="标题 1"/>
+          <p:cNvSpPr>
+            <a:spLocks noGrp="1"/>
+          </p:cNvSpPr>
+          <p:nvPr>
+            <p:ph type="title"/>
+          </p:nvPr>
+        </p:nvSpPr>
+        <p:spPr/>
+        <p:txBody>
+          <a:bodyPr/>
+          <a:lstStyle/>
+          <a:p>
             <a:pPr algn="ctr"/>
             <a:r>
               <a:rPr lang="zh-CN" altLang="en-US" b="1" dirty="0"/>
@@ -4198,11 +5394,7 @@
           <a:p>
             <a:r>
               <a:rPr lang="zh-CN" altLang="en-US" sz="3200" dirty="0" smtClean="0"/>
-              <a:t>将来需要进行的工作</a:t>
-            </a:r>
-            <a:r>
-              <a:rPr lang="zh-CN" altLang="en-US" sz="3200" dirty="0" smtClean="0"/>
-              <a:t>。</a:t>
+              <a:t>将来需要进行的工作。</a:t>
             </a:r>
             <a:endParaRPr lang="en-US" altLang="zh-CN" sz="3200" dirty="0" smtClean="0"/>
           </a:p>
@@ -4248,7 +5440,7 @@
 </p:sld>
 </file>
 
-<file path=ppt/slides/slide13.xml><?xml version="1.0" encoding="utf-8"?>
+<file path=ppt/slides/slide22.xml><?xml version="1.0" encoding="utf-8"?>
 <p:sld xmlns:a="http://schemas.openxmlformats.org/drawingml/2006/main" xmlns:r="http://schemas.openxmlformats.org/officeDocument/2006/relationships" xmlns:p="http://schemas.openxmlformats.org/presentationml/2006/main">
   <p:cSld>
     <p:spTree>
@@ -4310,161 +5502,6 @@
       </p:par>
     </p:tnLst>
   </p:timing>
-</p:sld>
-</file>
-
-<file path=ppt/slides/slide2.xml><?xml version="1.0" encoding="utf-8"?>
-<p:sld xmlns:a="http://schemas.openxmlformats.org/drawingml/2006/main" xmlns:r="http://schemas.openxmlformats.org/officeDocument/2006/relationships" xmlns:p="http://schemas.openxmlformats.org/presentationml/2006/main">
-  <p:cSld>
-    <p:spTree>
-      <p:nvGrpSpPr>
-        <p:cNvPr id="1" name=""/>
-        <p:cNvGrpSpPr/>
-        <p:nvPr/>
-      </p:nvGrpSpPr>
-      <p:grpSpPr>
-        <a:xfrm>
-          <a:off x="0" y="0"/>
-          <a:ext cx="0" cy="0"/>
-          <a:chOff x="0" y="0"/>
-          <a:chExt cx="0" cy="0"/>
-        </a:xfrm>
-      </p:grpSpPr>
-      <p:sp>
-        <p:nvSpPr>
-          <p:cNvPr id="2" name="标题 1"/>
-          <p:cNvSpPr>
-            <a:spLocks noGrp="1"/>
-          </p:cNvSpPr>
-          <p:nvPr>
-            <p:ph type="title"/>
-          </p:nvPr>
-        </p:nvSpPr>
-        <p:spPr/>
-        <p:txBody>
-          <a:bodyPr/>
-          <a:lstStyle/>
-          <a:p>
-            <a:pPr algn="ctr"/>
-            <a:r>
-              <a:rPr lang="zh-CN" altLang="en-US" dirty="0" smtClean="0"/>
-              <a:t>主要内容</a:t>
-            </a:r>
-            <a:endParaRPr lang="zh-CN" altLang="en-US" dirty="0"/>
-          </a:p>
-        </p:txBody>
-      </p:sp>
-      <p:sp>
-        <p:nvSpPr>
-          <p:cNvPr id="3" name="内容占位符 2"/>
-          <p:cNvSpPr>
-            <a:spLocks noGrp="1"/>
-          </p:cNvSpPr>
-          <p:nvPr>
-            <p:ph idx="1"/>
-          </p:nvPr>
-        </p:nvSpPr>
-        <p:spPr/>
-        <p:txBody>
-          <a:bodyPr/>
-          <a:lstStyle/>
-          <a:p>
-            <a:r>
-              <a:rPr lang="zh-CN" altLang="en-US" dirty="0" smtClean="0"/>
-              <a:t>分阶段</a:t>
-            </a:r>
-            <a:endParaRPr lang="en-US" altLang="zh-CN" dirty="0" smtClean="0"/>
-          </a:p>
-          <a:p>
-            <a:r>
-              <a:rPr lang="zh-CN" altLang="en-US" dirty="0" smtClean="0"/>
-              <a:t>硬件</a:t>
-            </a:r>
-            <a:r>
-              <a:rPr lang="zh-CN" altLang="en-US" dirty="0" smtClean="0"/>
-              <a:t>构成</a:t>
-            </a:r>
-            <a:endParaRPr lang="en-US" altLang="zh-CN" dirty="0" smtClean="0"/>
-          </a:p>
-          <a:p>
-            <a:r>
-              <a:rPr lang="zh-CN" altLang="en-US" dirty="0" smtClean="0"/>
-              <a:t>软件框架（</a:t>
-            </a:r>
-            <a:r>
-              <a:rPr lang="en-US" altLang="zh-CN" dirty="0" err="1" smtClean="0"/>
-              <a:t>bpsk</a:t>
-            </a:r>
-            <a:r>
-              <a:rPr lang="en-US" altLang="zh-CN" dirty="0" smtClean="0"/>
-              <a:t>/</a:t>
-            </a:r>
-            <a:r>
-              <a:rPr lang="en-US" altLang="zh-CN" dirty="0" err="1" smtClean="0"/>
-              <a:t>qpsk</a:t>
-            </a:r>
-            <a:r>
-              <a:rPr lang="zh-CN" altLang="en-US" dirty="0" smtClean="0"/>
-              <a:t>实现的</a:t>
-            </a:r>
-            <a:r>
-              <a:rPr lang="en-US" altLang="zh-CN" dirty="0" smtClean="0"/>
-              <a:t>OFDM</a:t>
-            </a:r>
-            <a:r>
-              <a:rPr lang="zh-CN" altLang="en-US" dirty="0" smtClean="0"/>
-              <a:t>，以及虚拟网卡</a:t>
-            </a:r>
-            <a:r>
-              <a:rPr lang="en-US" altLang="zh-CN" dirty="0" smtClean="0"/>
-              <a:t>Tap</a:t>
-            </a:r>
-            <a:r>
-              <a:rPr lang="zh-CN" altLang="en-US" dirty="0" smtClean="0"/>
-              <a:t>）</a:t>
-            </a:r>
-            <a:endParaRPr lang="en-US" altLang="zh-CN" dirty="0" smtClean="0"/>
-          </a:p>
-          <a:p>
-            <a:r>
-              <a:rPr lang="zh-CN" altLang="en-US" dirty="0" smtClean="0"/>
-              <a:t>测试场景</a:t>
-            </a:r>
-            <a:endParaRPr lang="en-US" altLang="zh-CN" dirty="0" smtClean="0"/>
-          </a:p>
-          <a:p>
-            <a:r>
-              <a:rPr lang="en-US" altLang="zh-CN" dirty="0" smtClean="0"/>
-              <a:t>ping</a:t>
-            </a:r>
-            <a:r>
-              <a:rPr lang="zh-CN" altLang="en-US" dirty="0" smtClean="0"/>
-              <a:t>测试通信延迟</a:t>
-            </a:r>
-            <a:endParaRPr lang="en-US" altLang="zh-CN" dirty="0" smtClean="0"/>
-          </a:p>
-          <a:p>
-            <a:r>
-              <a:rPr lang="zh-CN" altLang="en-US" dirty="0" smtClean="0"/>
-              <a:t>目前存在的问题</a:t>
-            </a:r>
-            <a:endParaRPr lang="en-US" altLang="zh-CN" dirty="0" smtClean="0"/>
-          </a:p>
-          <a:p>
-            <a:endParaRPr lang="en-US" altLang="zh-CN" dirty="0" smtClean="0"/>
-          </a:p>
-        </p:txBody>
-      </p:sp>
-    </p:spTree>
-    <p:extLst>
-      <p:ext uri="{BB962C8B-B14F-4D97-AF65-F5344CB8AC3E}">
-        <p14:creationId xmlns:p14="http://schemas.microsoft.com/office/powerpoint/2010/main" val="1697157127"/>
-      </p:ext>
-    </p:extLst>
-  </p:cSld>
-  <p:clrMapOvr>
-    <a:masterClrMapping/>
-  </p:clrMapOvr>
 </p:sld>
 </file>
 
@@ -4649,7 +5686,7 @@
             <a:pPr algn="ctr"/>
             <a:r>
               <a:rPr lang="zh-CN" altLang="en-US" dirty="0" smtClean="0"/>
-              <a:t>硬件构成</a:t>
+              <a:t>阶段实施原因</a:t>
             </a:r>
             <a:endParaRPr lang="zh-CN" altLang="en-US" dirty="0"/>
           </a:p>
@@ -4671,67 +5708,51 @@
           <a:lstStyle/>
           <a:p>
             <a:r>
+              <a:rPr lang="zh-CN" altLang="en-US" dirty="0" smtClean="0"/>
+              <a:t>如果在</a:t>
+            </a:r>
+            <a:r>
               <a:rPr lang="en-US" altLang="zh-CN" dirty="0" smtClean="0"/>
-              <a:t>ADALM-PLUTO </a:t>
-            </a:r>
-            <a:r>
-              <a:rPr lang="zh-CN" altLang="en-US" dirty="0" smtClean="0"/>
-              <a:t>开发板</a:t>
-            </a:r>
-            <a:r>
-              <a:rPr lang="en-US" altLang="zh-CN" dirty="0"/>
-              <a:t>N</a:t>
-            </a:r>
-            <a:r>
-              <a:rPr lang="zh-CN" altLang="en-US" dirty="0" smtClean="0"/>
-              <a:t>块</a:t>
-            </a:r>
-            <a:r>
-              <a:rPr lang="zh-CN" altLang="en-US" dirty="0" smtClean="0"/>
-              <a:t>。</a:t>
+              <a:t>PC</a:t>
+            </a:r>
+            <a:r>
+              <a:rPr lang="zh-CN" altLang="en-US" dirty="0" smtClean="0"/>
+              <a:t>上达不到最高性能，在开发板上绝无可能达到最佳性能</a:t>
             </a:r>
             <a:endParaRPr lang="en-US" altLang="zh-CN" dirty="0" smtClean="0"/>
           </a:p>
           <a:p>
             <a:r>
-              <a:rPr lang="zh-CN" altLang="en-US" dirty="0" smtClean="0"/>
-              <a:t>电脑</a:t>
-            </a:r>
-            <a:r>
               <a:rPr lang="en-US" altLang="zh-CN" dirty="0" smtClean="0"/>
-              <a:t>N</a:t>
-            </a:r>
-            <a:r>
-              <a:rPr lang="zh-CN" altLang="en-US" dirty="0" smtClean="0"/>
-              <a:t>台</a:t>
+              <a:t>PC</a:t>
+            </a:r>
+            <a:r>
+              <a:rPr lang="zh-CN" altLang="en-US" dirty="0" smtClean="0"/>
+              <a:t>端便于开发调试</a:t>
             </a:r>
             <a:endParaRPr lang="en-US" altLang="zh-CN" dirty="0" smtClean="0"/>
           </a:p>
           <a:p>
             <a:r>
+              <a:rPr lang="zh-CN" altLang="en-US" dirty="0" smtClean="0"/>
+              <a:t>利用</a:t>
+            </a:r>
+            <a:r>
               <a:rPr lang="en-US" altLang="zh-CN" dirty="0" err="1" smtClean="0"/>
-              <a:t>Usb</a:t>
-            </a:r>
-            <a:r>
-              <a:rPr lang="zh-CN" altLang="en-US" dirty="0" smtClean="0"/>
-              <a:t>线</a:t>
-            </a:r>
-            <a:r>
-              <a:rPr lang="en-US" altLang="zh-CN" dirty="0" smtClean="0"/>
-              <a:t>N</a:t>
-            </a:r>
-            <a:r>
-              <a:rPr lang="zh-CN" altLang="en-US" dirty="0" smtClean="0"/>
-              <a:t>条</a:t>
-            </a:r>
-            <a:endParaRPr lang="en-US" altLang="zh-CN" dirty="0" smtClean="0"/>
+              <a:t>buildroot</a:t>
+            </a:r>
+            <a:r>
+              <a:rPr lang="zh-CN" altLang="en-US" dirty="0" smtClean="0"/>
+              <a:t>能将绝大部分功能交叉移植到开发板上</a:t>
+            </a:r>
+            <a:endParaRPr lang="zh-CN" altLang="en-US" dirty="0"/>
           </a:p>
         </p:txBody>
       </p:sp>
     </p:spTree>
     <p:extLst>
       <p:ext uri="{BB962C8B-B14F-4D97-AF65-F5344CB8AC3E}">
-        <p14:creationId xmlns:p14="http://schemas.microsoft.com/office/powerpoint/2010/main" val="1782169044"/>
+        <p14:creationId xmlns:p14="http://schemas.microsoft.com/office/powerpoint/2010/main" val="2408885414"/>
       </p:ext>
     </p:extLst>
   </p:cSld>
@@ -4776,6 +5797,221 @@
             <a:pPr algn="ctr"/>
             <a:r>
               <a:rPr lang="zh-CN" altLang="en-US" dirty="0" smtClean="0"/>
+              <a:t>硬件构成</a:t>
+            </a:r>
+            <a:endParaRPr lang="zh-CN" altLang="en-US" dirty="0"/>
+          </a:p>
+        </p:txBody>
+      </p:sp>
+      <p:sp>
+        <p:nvSpPr>
+          <p:cNvPr id="3" name="内容占位符 2"/>
+          <p:cNvSpPr>
+            <a:spLocks noGrp="1"/>
+          </p:cNvSpPr>
+          <p:nvPr>
+            <p:ph idx="1"/>
+          </p:nvPr>
+        </p:nvSpPr>
+        <p:spPr/>
+        <p:txBody>
+          <a:bodyPr/>
+          <a:lstStyle/>
+          <a:p>
+            <a:r>
+              <a:rPr lang="en-US" altLang="zh-CN" dirty="0" smtClean="0"/>
+              <a:t>ADALM-PLUTO </a:t>
+            </a:r>
+            <a:r>
+              <a:rPr lang="zh-CN" altLang="en-US" dirty="0" smtClean="0"/>
+              <a:t>开发板</a:t>
+            </a:r>
+            <a:r>
+              <a:rPr lang="en-US" altLang="zh-CN" dirty="0"/>
+              <a:t>N</a:t>
+            </a:r>
+            <a:r>
+              <a:rPr lang="zh-CN" altLang="en-US" dirty="0" smtClean="0"/>
+              <a:t>块。</a:t>
+            </a:r>
+            <a:endParaRPr lang="en-US" altLang="zh-CN" dirty="0" smtClean="0"/>
+          </a:p>
+          <a:p>
+            <a:r>
+              <a:rPr lang="zh-CN" altLang="en-US" dirty="0" smtClean="0"/>
+              <a:t>电脑</a:t>
+            </a:r>
+            <a:r>
+              <a:rPr lang="en-US" altLang="zh-CN" dirty="0" smtClean="0"/>
+              <a:t>N</a:t>
+            </a:r>
+            <a:r>
+              <a:rPr lang="zh-CN" altLang="en-US" dirty="0" smtClean="0"/>
+              <a:t>台</a:t>
+            </a:r>
+            <a:endParaRPr lang="en-US" altLang="zh-CN" dirty="0" smtClean="0"/>
+          </a:p>
+          <a:p>
+            <a:r>
+              <a:rPr lang="en-US" altLang="zh-CN" dirty="0" err="1" smtClean="0"/>
+              <a:t>Usb</a:t>
+            </a:r>
+            <a:r>
+              <a:rPr lang="zh-CN" altLang="en-US" dirty="0" smtClean="0"/>
+              <a:t>线</a:t>
+            </a:r>
+            <a:r>
+              <a:rPr lang="en-US" altLang="zh-CN" dirty="0" smtClean="0"/>
+              <a:t>N</a:t>
+            </a:r>
+            <a:r>
+              <a:rPr lang="zh-CN" altLang="en-US" dirty="0" smtClean="0"/>
+              <a:t>条</a:t>
+            </a:r>
+            <a:endParaRPr lang="en-US" altLang="zh-CN" dirty="0" smtClean="0"/>
+          </a:p>
+        </p:txBody>
+      </p:sp>
+    </p:spTree>
+    <p:extLst>
+      <p:ext uri="{BB962C8B-B14F-4D97-AF65-F5344CB8AC3E}">
+        <p14:creationId xmlns:p14="http://schemas.microsoft.com/office/powerpoint/2010/main" val="1782169044"/>
+      </p:ext>
+    </p:extLst>
+  </p:cSld>
+  <p:clrMapOvr>
+    <a:masterClrMapping/>
+  </p:clrMapOvr>
+</p:sld>
+</file>
+
+<file path=ppt/slides/slide6.xml><?xml version="1.0" encoding="utf-8"?>
+<p:sld xmlns:a="http://schemas.openxmlformats.org/drawingml/2006/main" xmlns:r="http://schemas.openxmlformats.org/officeDocument/2006/relationships" xmlns:p="http://schemas.openxmlformats.org/presentationml/2006/main">
+  <p:cSld>
+    <p:spTree>
+      <p:nvGrpSpPr>
+        <p:cNvPr id="1" name=""/>
+        <p:cNvGrpSpPr/>
+        <p:nvPr/>
+      </p:nvGrpSpPr>
+      <p:grpSpPr>
+        <a:xfrm>
+          <a:off x="0" y="0"/>
+          <a:ext cx="0" cy="0"/>
+          <a:chOff x="0" y="0"/>
+          <a:chExt cx="0" cy="0"/>
+        </a:xfrm>
+      </p:grpSpPr>
+      <p:sp>
+        <p:nvSpPr>
+          <p:cNvPr id="2" name="标题 1"/>
+          <p:cNvSpPr>
+            <a:spLocks noGrp="1"/>
+          </p:cNvSpPr>
+          <p:nvPr>
+            <p:ph type="title"/>
+          </p:nvPr>
+        </p:nvSpPr>
+        <p:spPr/>
+        <p:txBody>
+          <a:bodyPr/>
+          <a:lstStyle/>
+          <a:p>
+            <a:pPr algn="ctr"/>
+            <a:r>
+              <a:rPr lang="en-US" altLang="zh-CN" dirty="0"/>
+              <a:t>ADALM-PLUTO </a:t>
+            </a:r>
+            <a:r>
+              <a:rPr lang="zh-CN" altLang="en-US" dirty="0"/>
+              <a:t>开发</a:t>
+            </a:r>
+            <a:r>
+              <a:rPr lang="zh-CN" altLang="en-US" dirty="0" smtClean="0"/>
+              <a:t>板功能</a:t>
+            </a:r>
+            <a:endParaRPr lang="zh-CN" altLang="en-US" dirty="0"/>
+          </a:p>
+        </p:txBody>
+      </p:sp>
+      <p:sp>
+        <p:nvSpPr>
+          <p:cNvPr id="3" name="内容占位符 2"/>
+          <p:cNvSpPr>
+            <a:spLocks noGrp="1"/>
+          </p:cNvSpPr>
+          <p:nvPr>
+            <p:ph idx="1"/>
+          </p:nvPr>
+        </p:nvSpPr>
+        <p:spPr/>
+        <p:txBody>
+          <a:bodyPr/>
+          <a:lstStyle/>
+          <a:p>
+            <a:r>
+              <a:rPr lang="zh-CN" altLang="en-US" dirty="0" smtClean="0"/>
+              <a:t>无调制解调功能</a:t>
+            </a:r>
+            <a:endParaRPr lang="en-US" altLang="zh-CN" dirty="0" smtClean="0"/>
+          </a:p>
+          <a:p>
+            <a:r>
+              <a:rPr lang="zh-CN" altLang="en-US" dirty="0" smtClean="0"/>
+              <a:t>控制寄存器输出无线原始电平信号</a:t>
+            </a:r>
+            <a:endParaRPr lang="zh-CN" altLang="en-US" dirty="0"/>
+          </a:p>
+        </p:txBody>
+      </p:sp>
+    </p:spTree>
+    <p:extLst>
+      <p:ext uri="{BB962C8B-B14F-4D97-AF65-F5344CB8AC3E}">
+        <p14:creationId xmlns:p14="http://schemas.microsoft.com/office/powerpoint/2010/main" val="1114953246"/>
+      </p:ext>
+    </p:extLst>
+  </p:cSld>
+  <p:clrMapOvr>
+    <a:masterClrMapping/>
+  </p:clrMapOvr>
+</p:sld>
+</file>
+
+<file path=ppt/slides/slide7.xml><?xml version="1.0" encoding="utf-8"?>
+<p:sld xmlns:a="http://schemas.openxmlformats.org/drawingml/2006/main" xmlns:r="http://schemas.openxmlformats.org/officeDocument/2006/relationships" xmlns:p="http://schemas.openxmlformats.org/presentationml/2006/main">
+  <p:cSld>
+    <p:spTree>
+      <p:nvGrpSpPr>
+        <p:cNvPr id="1" name=""/>
+        <p:cNvGrpSpPr/>
+        <p:nvPr/>
+      </p:nvGrpSpPr>
+      <p:grpSpPr>
+        <a:xfrm>
+          <a:off x="0" y="0"/>
+          <a:ext cx="0" cy="0"/>
+          <a:chOff x="0" y="0"/>
+          <a:chExt cx="0" cy="0"/>
+        </a:xfrm>
+      </p:grpSpPr>
+      <p:sp>
+        <p:nvSpPr>
+          <p:cNvPr id="2" name="标题 1"/>
+          <p:cNvSpPr>
+            <a:spLocks noGrp="1"/>
+          </p:cNvSpPr>
+          <p:nvPr>
+            <p:ph type="title"/>
+          </p:nvPr>
+        </p:nvSpPr>
+        <p:spPr/>
+        <p:txBody>
+          <a:bodyPr/>
+          <a:lstStyle/>
+          <a:p>
+            <a:pPr algn="ctr"/>
+            <a:r>
+              <a:rPr lang="zh-CN" altLang="en-US" dirty="0" smtClean="0"/>
               <a:t>软件框架</a:t>
             </a:r>
             <a:endParaRPr lang="zh-CN" altLang="en-US" dirty="0"/>
@@ -4854,7 +6090,7 @@
 </p:sld>
 </file>
 
-<file path=ppt/slides/slide6.xml><?xml version="1.0" encoding="utf-8"?>
+<file path=ppt/slides/slide8.xml><?xml version="1.0" encoding="utf-8"?>
 <p:sld xmlns:a="http://schemas.openxmlformats.org/drawingml/2006/main" xmlns:r="http://schemas.openxmlformats.org/officeDocument/2006/relationships" xmlns:p="http://schemas.openxmlformats.org/presentationml/2006/main">
   <p:cSld>
     <p:spTree>
@@ -4932,7 +6168,7 @@
 </p:sld>
 </file>
 
-<file path=ppt/slides/slide7.xml><?xml version="1.0" encoding="utf-8"?>
+<file path=ppt/slides/slide9.xml><?xml version="1.0" encoding="utf-8"?>
 <p:sld xmlns:a="http://schemas.openxmlformats.org/drawingml/2006/main" xmlns:r="http://schemas.openxmlformats.org/officeDocument/2006/relationships" xmlns:p="http://schemas.openxmlformats.org/presentationml/2006/main">
   <p:cSld>
     <p:spTree>
@@ -5001,170 +6237,6 @@
     <p:extLst>
       <p:ext uri="{BB962C8B-B14F-4D97-AF65-F5344CB8AC3E}">
         <p14:creationId xmlns:p14="http://schemas.microsoft.com/office/powerpoint/2010/main" val="2937759065"/>
-      </p:ext>
-    </p:extLst>
-  </p:cSld>
-  <p:clrMapOvr>
-    <a:masterClrMapping/>
-  </p:clrMapOvr>
-</p:sld>
-</file>
-
-<file path=ppt/slides/slide8.xml><?xml version="1.0" encoding="utf-8"?>
-<p:sld xmlns:a="http://schemas.openxmlformats.org/drawingml/2006/main" xmlns:r="http://schemas.openxmlformats.org/officeDocument/2006/relationships" xmlns:p="http://schemas.openxmlformats.org/presentationml/2006/main">
-  <p:cSld>
-    <p:spTree>
-      <p:nvGrpSpPr>
-        <p:cNvPr id="1" name=""/>
-        <p:cNvGrpSpPr/>
-        <p:nvPr/>
-      </p:nvGrpSpPr>
-      <p:grpSpPr>
-        <a:xfrm>
-          <a:off x="0" y="0"/>
-          <a:ext cx="0" cy="0"/>
-          <a:chOff x="0" y="0"/>
-          <a:chExt cx="0" cy="0"/>
-        </a:xfrm>
-      </p:grpSpPr>
-      <p:sp>
-        <p:nvSpPr>
-          <p:cNvPr id="2" name="标题 1"/>
-          <p:cNvSpPr>
-            <a:spLocks noGrp="1"/>
-          </p:cNvSpPr>
-          <p:nvPr>
-            <p:ph type="title"/>
-          </p:nvPr>
-        </p:nvSpPr>
-        <p:spPr/>
-        <p:txBody>
-          <a:bodyPr/>
-          <a:lstStyle/>
-          <a:p>
-            <a:pPr algn="ctr"/>
-            <a:r>
-              <a:rPr lang="en-US" altLang="zh-CN" dirty="0" smtClean="0"/>
-              <a:t>TAP</a:t>
-            </a:r>
-            <a:r>
-              <a:rPr lang="zh-CN" altLang="en-US" dirty="0" smtClean="0"/>
-              <a:t>外部交互图</a:t>
-            </a:r>
-            <a:endParaRPr lang="zh-CN" altLang="en-US" dirty="0"/>
-          </a:p>
-        </p:txBody>
-      </p:sp>
-      <p:pic>
-        <p:nvPicPr>
-          <p:cNvPr id="5" name="图片 4"/>
-          <p:cNvPicPr>
-            <a:picLocks noChangeAspect="1"/>
-          </p:cNvPicPr>
-          <p:nvPr/>
-        </p:nvPicPr>
-        <p:blipFill>
-          <a:blip r:embed="rId2"/>
-          <a:stretch>
-            <a:fillRect/>
-          </a:stretch>
-        </p:blipFill>
-        <p:spPr>
-          <a:xfrm>
-            <a:off x="2548040" y="1936749"/>
-            <a:ext cx="6867320" cy="5092701"/>
-          </a:xfrm>
-          <a:prstGeom prst="rect">
-            <a:avLst/>
-          </a:prstGeom>
-        </p:spPr>
-      </p:pic>
-    </p:spTree>
-    <p:extLst>
-      <p:ext uri="{BB962C8B-B14F-4D97-AF65-F5344CB8AC3E}">
-        <p14:creationId xmlns:p14="http://schemas.microsoft.com/office/powerpoint/2010/main" val="160094247"/>
-      </p:ext>
-    </p:extLst>
-  </p:cSld>
-  <p:clrMapOvr>
-    <a:masterClrMapping/>
-  </p:clrMapOvr>
-</p:sld>
-</file>
-
-<file path=ppt/slides/slide9.xml><?xml version="1.0" encoding="utf-8"?>
-<p:sld xmlns:a="http://schemas.openxmlformats.org/drawingml/2006/main" xmlns:r="http://schemas.openxmlformats.org/officeDocument/2006/relationships" xmlns:p="http://schemas.openxmlformats.org/presentationml/2006/main">
-  <p:cSld>
-    <p:spTree>
-      <p:nvGrpSpPr>
-        <p:cNvPr id="1" name=""/>
-        <p:cNvGrpSpPr/>
-        <p:nvPr/>
-      </p:nvGrpSpPr>
-      <p:grpSpPr>
-        <a:xfrm>
-          <a:off x="0" y="0"/>
-          <a:ext cx="0" cy="0"/>
-          <a:chOff x="0" y="0"/>
-          <a:chExt cx="0" cy="0"/>
-        </a:xfrm>
-      </p:grpSpPr>
-      <p:sp>
-        <p:nvSpPr>
-          <p:cNvPr id="2" name="标题 1"/>
-          <p:cNvSpPr>
-            <a:spLocks noGrp="1"/>
-          </p:cNvSpPr>
-          <p:nvPr>
-            <p:ph type="title"/>
-          </p:nvPr>
-        </p:nvSpPr>
-        <p:spPr/>
-        <p:txBody>
-          <a:bodyPr/>
-          <a:lstStyle/>
-          <a:p>
-            <a:pPr algn="ctr"/>
-            <a:r>
-              <a:rPr lang="en-US" altLang="zh-CN" dirty="0" err="1" smtClean="0"/>
-              <a:t>GNURadio</a:t>
-            </a:r>
-            <a:r>
-              <a:rPr lang="zh-CN" altLang="en-US" dirty="0" smtClean="0"/>
-              <a:t>外部交互图</a:t>
-            </a:r>
-            <a:endParaRPr lang="zh-CN" altLang="en-US" dirty="0"/>
-          </a:p>
-        </p:txBody>
-      </p:sp>
-      <p:pic>
-        <p:nvPicPr>
-          <p:cNvPr id="4" name="图片 3"/>
-          <p:cNvPicPr>
-            <a:picLocks noChangeAspect="1"/>
-          </p:cNvPicPr>
-          <p:nvPr/>
-        </p:nvPicPr>
-        <p:blipFill>
-          <a:blip r:embed="rId2"/>
-          <a:stretch>
-            <a:fillRect/>
-          </a:stretch>
-        </p:blipFill>
-        <p:spPr>
-          <a:xfrm>
-            <a:off x="2992327" y="2177288"/>
-            <a:ext cx="6004145" cy="4673600"/>
-          </a:xfrm>
-          <a:prstGeom prst="rect">
-            <a:avLst/>
-          </a:prstGeom>
-        </p:spPr>
-      </p:pic>
-    </p:spTree>
-    <p:extLst>
-      <p:ext uri="{BB962C8B-B14F-4D97-AF65-F5344CB8AC3E}">
-        <p14:creationId xmlns:p14="http://schemas.microsoft.com/office/powerpoint/2010/main" val="313124562"/>
       </p:ext>
     </p:extLst>
   </p:cSld>

</xml_diff>